<commit_message>
Clarify that thery are many tainting annotations
</commit_message>
<xml_diff>
--- a/nonnull-interned-demo/checkers-demo-201408-coverity.pptx
+++ b/nonnull-interned-demo/checkers-demo-201408-coverity.pptx
@@ -265,7 +265,7 @@
             <a:fld id="{F1CB0A62-8E67-4C9C-BD0A-1B623B6FF41A}" type="datetimeFigureOut">
               <a:rPr lang="en-US" smtClean="0"/>
               <a:pPr/>
-              <a:t>8/27/2014</a:t>
+              <a:t>8/29/2014</a:t>
             </a:fld>
             <a:endParaRPr lang="en-US"/>
           </a:p>
@@ -432,7 +432,7 @@
             <a:fld id="{7E352BF5-329B-4DBF-99DF-ACF46ECAA31D}" type="datetimeFigureOut">
               <a:rPr lang="en-US" smtClean="0"/>
               <a:pPr/>
-              <a:t>8/27/2014</a:t>
+              <a:t>8/29/2014</a:t>
             </a:fld>
             <a:endParaRPr lang="en-US"/>
           </a:p>
@@ -1654,7 +1654,7 @@
             <a:fld id="{68E1BC78-26EE-F449-AB4E-4B63390B0AE5}" type="datetimeFigureOut">
               <a:rPr lang="nl-NL" smtClean="0"/>
               <a:pPr/>
-              <a:t>27-8-2014</a:t>
+              <a:t>29-8-2014</a:t>
             </a:fld>
             <a:endParaRPr lang="nl-NL"/>
           </a:p>
@@ -1950,7 +1950,7 @@
             <a:fld id="{68E1BC78-26EE-F449-AB4E-4B63390B0AE5}" type="datetimeFigureOut">
               <a:rPr lang="nl-NL" smtClean="0"/>
               <a:pPr/>
-              <a:t>27-8-2014</a:t>
+              <a:t>29-8-2014</a:t>
             </a:fld>
             <a:endParaRPr lang="nl-NL"/>
           </a:p>
@@ -2319,7 +2319,7 @@
             <a:fld id="{68E1BC78-26EE-F449-AB4E-4B63390B0AE5}" type="datetimeFigureOut">
               <a:rPr lang="nl-NL" smtClean="0"/>
               <a:pPr/>
-              <a:t>27-8-2014</a:t>
+              <a:t>29-8-2014</a:t>
             </a:fld>
             <a:endParaRPr lang="nl-NL" dirty="0"/>
           </a:p>
@@ -2821,13 +2821,8 @@
             <a:pPr algn="ctr"/>
             <a:r>
               <a:rPr lang="en-US" sz="2400" dirty="0" smtClean="0"/>
-              <a:t>http</a:t>
-            </a:r>
-            <a:r>
-              <a:rPr lang="en-US" sz="2400" dirty="0" smtClean="0"/>
-              <a:t>://checkerframework.org/</a:t>
-            </a:r>
-            <a:endParaRPr lang="en-US" sz="2400" dirty="0" smtClean="0"/>
+              <a:t>http://checkerframework.org/</a:t>
+            </a:r>
           </a:p>
         </p:txBody>
       </p:sp>
@@ -3116,7 +3111,6 @@
               <a:rPr lang="en-US" dirty="0" smtClean="0"/>
               <a:t>Conclusion</a:t>
             </a:r>
-            <a:endParaRPr lang="en-US" dirty="0" smtClean="0"/>
           </a:p>
         </p:txBody>
       </p:sp>
@@ -3239,7 +3233,7 @@
         <p:spPr>
           <a:xfrm>
             <a:off x="457199" y="1341420"/>
-            <a:ext cx="8563429" cy="5054600"/>
+            <a:ext cx="8686800" cy="5054600"/>
           </a:xfrm>
           <a:prstGeom prst="rect">
             <a:avLst/>
@@ -3534,7 +3528,42 @@
                 <a:latin typeface="Courier New" pitchFamily="49" charset="0"/>
                 <a:cs typeface="Courier New" pitchFamily="49" charset="0"/>
               </a:rPr>
-              <a:t>@Untainted</a:t>
+              <a:t>@</a:t>
+            </a:r>
+            <a:r>
+              <a:rPr lang="en-US" sz="2200" b="1" dirty="0" err="1" smtClean="0">
+                <a:latin typeface="Courier New" pitchFamily="49" charset="0"/>
+                <a:cs typeface="Courier New" pitchFamily="49" charset="0"/>
+              </a:rPr>
+              <a:t>OsTrusted</a:t>
+            </a:r>
+            <a:r>
+              <a:rPr lang="en-US" sz="2200" b="1" dirty="0" smtClean="0">
+                <a:latin typeface="+mj-lt"/>
+                <a:cs typeface="Courier New" pitchFamily="49" charset="0"/>
+              </a:rPr>
+              <a:t>, </a:t>
+            </a:r>
+            <a:r>
+              <a:rPr lang="en-US" sz="1600" b="1" dirty="0" smtClean="0">
+                <a:latin typeface="Courier New" pitchFamily="49" charset="0"/>
+                <a:cs typeface="Courier New" pitchFamily="49" charset="0"/>
+              </a:rPr>
+              <a:t>@</a:t>
+            </a:r>
+            <a:r>
+              <a:rPr lang="en-US" sz="1600" b="1" dirty="0" err="1" smtClean="0">
+                <a:latin typeface="Courier New" pitchFamily="49" charset="0"/>
+                <a:cs typeface="Courier New" pitchFamily="49" charset="0"/>
+              </a:rPr>
+              <a:t>Untaint</a:t>
+            </a:r>
+            <a:r>
+              <a:rPr lang="en-US" sz="2200" b="1" dirty="0" smtClean="0">
+                <a:latin typeface="Courier New" pitchFamily="49" charset="0"/>
+                <a:cs typeface="Courier New" pitchFamily="49" charset="0"/>
+              </a:rPr>
+              <a:t>…</a:t>
             </a:r>
             <a:endParaRPr kumimoji="0" lang="en-US" sz="2200" b="0" i="0" u="none" strike="noStrike" kern="1200" cap="none" spc="0" normalizeH="0" baseline="0" noProof="0" dirty="0" smtClean="0">
               <a:ln>
@@ -3696,11 +3725,7 @@
             </a:br>
             <a:r>
               <a:rPr lang="en-US" sz="2200" dirty="0" smtClean="0"/>
-              <a:t>signature representation,</a:t>
-            </a:r>
-            <a:r>
-              <a:rPr lang="en-US" sz="2200" dirty="0" smtClean="0"/>
-              <a:t>						</a:t>
+              <a:t>signature representation,						</a:t>
             </a:r>
             <a:r>
               <a:rPr lang="en-US" sz="2200" b="1" dirty="0" smtClean="0">
@@ -3762,14 +3787,7 @@
                 <a:latin typeface="Courier New" pitchFamily="49" charset="0"/>
                 <a:cs typeface="Courier New" pitchFamily="49" charset="0"/>
               </a:rPr>
-              <a:t>									</a:t>
-            </a:r>
-            <a:r>
-              <a:rPr lang="en-US" sz="2200" b="1" dirty="0" smtClean="0">
-                <a:latin typeface="Courier New" pitchFamily="49" charset="0"/>
-                <a:cs typeface="Courier New" pitchFamily="49" charset="0"/>
-              </a:rPr>
-              <a:t>@</a:t>
+              <a:t>									@</a:t>
             </a:r>
             <a:r>
               <a:rPr lang="en-US" sz="2200" b="1" dirty="0" err="1" smtClean="0">
@@ -4086,15 +4104,7 @@
           <a:p>
             <a:r>
               <a:rPr lang="en-US" dirty="0" smtClean="0"/>
-              <a:t>F</a:t>
-            </a:r>
-            <a:r>
-              <a:rPr lang="en-US" dirty="0" smtClean="0"/>
-              <a:t>amiliar workflow and error </a:t>
-            </a:r>
-            <a:r>
-              <a:rPr lang="en-US" dirty="0" smtClean="0"/>
-              <a:t>messages</a:t>
+              <a:t>Familiar workflow and error messages</a:t>
             </a:r>
           </a:p>
           <a:p>
@@ -4752,13 +4762,8 @@
           <a:p>
             <a:r>
               <a:rPr lang="en-US" dirty="0" smtClean="0"/>
-              <a:t>Over 3,000,000 LOC </a:t>
-            </a:r>
-            <a:r>
-              <a:rPr lang="en-US" dirty="0" smtClean="0"/>
-              <a:t>checked (as of 2011)</a:t>
-            </a:r>
-            <a:endParaRPr lang="en-US" dirty="0" smtClean="0"/>
+              <a:t>Over 3,000,000 LOC checked (as of 2011)</a:t>
+            </a:r>
           </a:p>
           <a:p>
             <a:r>
@@ -4870,11 +4875,7 @@
           <a:p>
             <a:r>
               <a:rPr lang="en-US" dirty="0" smtClean="0"/>
-              <a:t>Selected case </a:t>
-            </a:r>
-            <a:r>
-              <a:rPr lang="en-US" dirty="0" smtClean="0"/>
-              <a:t>study results</a:t>
+              <a:t>Selected case study results</a:t>
             </a:r>
             <a:endParaRPr lang="en-US" dirty="0"/>
           </a:p>
@@ -4969,19 +4970,25 @@
           <a:p>
             <a:r>
               <a:rPr lang="en-US" sz="3400" dirty="0" smtClean="0"/>
-              <a:t>Regular expressions:  50 errors in Apache, etc</a:t>
-            </a:r>
+              <a:t>Regular expressions:  56 errors in Apache, etc.; 200 </a:t>
+            </a:r>
+            <a:r>
+              <a:rPr lang="en-US" sz="3400" dirty="0" err="1" smtClean="0"/>
+              <a:t>annos</a:t>
+            </a:r>
+            <a:endParaRPr lang="en-US" sz="3400" dirty="0" smtClean="0"/>
+          </a:p>
+          <a:p>
             <a:r>
               <a:rPr lang="en-US" sz="3400" dirty="0" smtClean="0"/>
-              <a:t>.</a:t>
+              <a:t>Format strings: 104 errors, only 107 annotations required</a:t>
             </a:r>
           </a:p>
           <a:p>
             <a:r>
               <a:rPr lang="en-US" sz="3400" dirty="0" smtClean="0"/>
-              <a:t>Format strings: 100 errors, only 100 annotations required</a:t>
-            </a:r>
-            <a:endParaRPr lang="en-US" sz="3400" dirty="0" smtClean="0"/>
+              <a:t>… many more</a:t>
+            </a:r>
           </a:p>
           <a:p>
             <a:endParaRPr lang="en-US" sz="3400" dirty="0"/>
@@ -5070,11 +5077,7 @@
             </a:r>
             <a:r>
               <a:rPr lang="en-US" dirty="0" smtClean="0"/>
-              <a:t> </a:t>
-            </a:r>
-            <a:r>
-              <a:rPr lang="en-US" dirty="0" smtClean="0"/>
-              <a:t>tools</a:t>
+              <a:t> tools</a:t>
             </a:r>
           </a:p>
         </p:txBody>
@@ -7638,7 +7641,22 @@
             <a:pPr lvl="1"/>
             <a:r>
               <a:rPr lang="en-US" dirty="0" smtClean="0"/>
-              <a:t>Infers types for local variables</a:t>
+              <a:t>Infers types for </a:t>
+            </a:r>
+            <a:r>
+              <a:rPr lang="en-US" smtClean="0"/>
+              <a:t>local variables</a:t>
+            </a:r>
+          </a:p>
+          <a:p>
+            <a:pPr lvl="1"/>
+            <a:r>
+              <a:rPr lang="en-US" smtClean="0"/>
+              <a:t>reusable </a:t>
+            </a:r>
+            <a:r>
+              <a:rPr lang="en-US" dirty="0" smtClean="0"/>
+              <a:t>component</a:t>
             </a:r>
           </a:p>
           <a:p>
@@ -7939,11 +7957,7 @@
             </a:pPr>
             <a:r>
               <a:rPr lang="en-US" dirty="0" smtClean="0"/>
-              <a:t>Possible </a:t>
-            </a:r>
-            <a:r>
-              <a:rPr lang="en-US" dirty="0" smtClean="0"/>
-              <a:t>to annotate part of program</a:t>
+              <a:t>Possible to annotate part of program</a:t>
             </a:r>
           </a:p>
           <a:p>
@@ -7973,13 +7987,8 @@
             </a:r>
             <a:r>
               <a:rPr lang="en-US" dirty="0" smtClean="0"/>
-              <a:t>, </a:t>
-            </a:r>
-            <a:r>
-              <a:rPr lang="en-US" dirty="0" smtClean="0"/>
-              <a:t>mutability</a:t>
-            </a:r>
-            <a:endParaRPr lang="en-US" dirty="0" smtClean="0"/>
+              <a:t>, mutability</a:t>
+            </a:r>
           </a:p>
           <a:p>
             <a:pPr lvl="1">
@@ -7989,11 +7998,7 @@
             </a:pPr>
             <a:r>
               <a:rPr lang="en-US" dirty="0" smtClean="0"/>
-              <a:t>Adds annotations throughout your </a:t>
-            </a:r>
-            <a:r>
-              <a:rPr lang="en-US" dirty="0" smtClean="0"/>
-              <a:t>program</a:t>
+              <a:t>Adds annotations throughout your program</a:t>
             </a:r>
           </a:p>
           <a:p>
@@ -8875,7 +8880,6 @@
               <a:rPr lang="en-US" dirty="0" smtClean="0"/>
               <a:t>Conclusion</a:t>
             </a:r>
-            <a:endParaRPr lang="en-US" dirty="0" smtClean="0"/>
           </a:p>
         </p:txBody>
       </p:sp>
@@ -9233,7 +9237,7 @@
           <a:p>
             <a:pPr eaLnBrk="1" hangingPunct="1"/>
             <a:r>
-              <a:rPr lang="en-US" smtClean="0"/>
+              <a:rPr lang="en-US" dirty="0" smtClean="0"/>
               <a:t>Taint checker</a:t>
             </a:r>
           </a:p>
@@ -9721,7 +9725,7 @@
           <a:lstStyle/>
           <a:p>
             <a:r>
-              <a:rPr lang="en-US" smtClean="0"/>
+              <a:rPr lang="en-US" dirty="0" smtClean="0"/>
               <a:t>Taint checker demo</a:t>
             </a:r>
           </a:p>
@@ -12248,11 +12252,7 @@
           <a:p>
             <a:r>
               <a:rPr lang="en-US" dirty="0" smtClean="0"/>
-              <a:t>Writing your own </a:t>
-            </a:r>
-            <a:r>
-              <a:rPr lang="en-US" dirty="0" smtClean="0"/>
-              <a:t>checker</a:t>
+              <a:t>Writing your own checker</a:t>
             </a:r>
           </a:p>
           <a:p>
@@ -12269,11 +12269,6 @@
               </a:rPr>
               <a:t>Verification vs. bug finding</a:t>
             </a:r>
-            <a:endParaRPr lang="en-US" b="1" dirty="0" smtClean="0">
-              <a:solidFill>
-                <a:srgbClr val="FF0000"/>
-              </a:solidFill>
-            </a:endParaRPr>
           </a:p>
           <a:p>
             <a:pPr>
@@ -13077,11 +13072,7 @@
           <a:p>
             <a:r>
               <a:rPr lang="en-US" dirty="0" smtClean="0"/>
-              <a:t>Writing your own </a:t>
-            </a:r>
-            <a:r>
-              <a:rPr lang="en-US" dirty="0" smtClean="0"/>
-              <a:t>checker</a:t>
+              <a:t>Writing your own checker</a:t>
             </a:r>
           </a:p>
           <a:p>
@@ -13093,7 +13084,6 @@
               <a:rPr lang="en-US" dirty="0" smtClean="0"/>
               <a:t>finding</a:t>
             </a:r>
-            <a:endParaRPr lang="en-US" dirty="0" smtClean="0"/>
           </a:p>
           <a:p>
             <a:pPr>
@@ -13299,13 +13289,7 @@
               <a:rPr lang="en-US" dirty="0" smtClean="0">
                 <a:hlinkClick r:id="rId3"/>
               </a:rPr>
-              <a:t>http</a:t>
-            </a:r>
-            <a:r>
-              <a:rPr lang="en-US" dirty="0" smtClean="0">
-                <a:hlinkClick r:id="rId3"/>
-              </a:rPr>
-              <a:t>://</a:t>
+              <a:t>http://</a:t>
             </a:r>
             <a:r>
               <a:rPr lang="en-US" dirty="0" smtClean="0">
@@ -13326,11 +13310,7 @@
             </a:r>
             <a:r>
               <a:rPr lang="en-US" sz="2400" smtClean="0"/>
-              <a:t>Checker </a:t>
-            </a:r>
-            <a:r>
-              <a:rPr lang="en-US" sz="2400" smtClean="0"/>
-              <a:t>Framework”)</a:t>
+              <a:t>Checker Framework”)</a:t>
             </a:r>
             <a:endParaRPr lang="en-US" sz="2400" dirty="0" smtClean="0"/>
           </a:p>
@@ -14747,7 +14727,6 @@
               <a:rPr lang="en-US" dirty="0" smtClean="0"/>
               <a:t>Conclusion</a:t>
             </a:r>
-            <a:endParaRPr lang="en-US" dirty="0" smtClean="0"/>
           </a:p>
         </p:txBody>
       </p:sp>
@@ -14874,23 +14853,11 @@
             <a:pPr eaLnBrk="1" hangingPunct="1"/>
             <a:r>
               <a:rPr lang="en-US" b="1" dirty="0" smtClean="0"/>
-              <a:t>In </a:t>
-            </a:r>
-            <a:r>
-              <a:rPr lang="en-US" b="1" dirty="0" smtClean="0"/>
-              <a:t>Java </a:t>
-            </a:r>
-            <a:r>
-              <a:rPr lang="en-US" b="1" dirty="0" smtClean="0"/>
-              <a:t>8</a:t>
-            </a:r>
-            <a:r>
-              <a:rPr lang="en-US" dirty="0" smtClean="0"/>
-              <a:t>:  </a:t>
-            </a:r>
-            <a:r>
-              <a:rPr lang="en-US" dirty="0" smtClean="0"/>
-              <a:t>annotations on types</a:t>
+              <a:t>In Java 8</a:t>
+            </a:r>
+            <a:r>
+              <a:rPr lang="en-US" dirty="0" smtClean="0"/>
+              <a:t>:  annotations on types</a:t>
             </a:r>
           </a:p>
           <a:p>

</xml_diff>